<commit_message>
EZO Assessment - bugfix
</commit_message>
<xml_diff>
--- a/Ezo-CalculatorProject.pptx
+++ b/Ezo-CalculatorProject.pptx
@@ -7,10 +7,12 @@
   <p:sldIdLst>
     <p:sldId id="256" r:id="rId2"/>
     <p:sldId id="257" r:id="rId3"/>
-    <p:sldId id="258" r:id="rId4"/>
-    <p:sldId id="259" r:id="rId5"/>
-    <p:sldId id="260" r:id="rId6"/>
-    <p:sldId id="261" r:id="rId7"/>
+    <p:sldId id="262" r:id="rId4"/>
+    <p:sldId id="258" r:id="rId5"/>
+    <p:sldId id="259" r:id="rId6"/>
+    <p:sldId id="260" r:id="rId7"/>
+    <p:sldId id="263" r:id="rId8"/>
+    <p:sldId id="261" r:id="rId9"/>
   </p:sldIdLst>
   <p:sldSz cx="9144000" cy="6858000" type="screen4x3"/>
   <p:notesSz cx="6858000" cy="9144000"/>
@@ -293,7 +295,7 @@
           <a:p>
             <a:fld id="{CCE7DC95-0A47-420E-AA60-2EBF55DD1E9C}" type="datetimeFigureOut">
               <a:rPr lang="pt-BR" smtClean="0"/>
-              <a:t>22/03/2021</a:t>
+              <a:t>26/03/2021</a:t>
             </a:fld>
             <a:endParaRPr lang="pt-BR"/>
           </a:p>
@@ -463,7 +465,7 @@
           <a:p>
             <a:fld id="{CCE7DC95-0A47-420E-AA60-2EBF55DD1E9C}" type="datetimeFigureOut">
               <a:rPr lang="pt-BR" smtClean="0"/>
-              <a:t>22/03/2021</a:t>
+              <a:t>26/03/2021</a:t>
             </a:fld>
             <a:endParaRPr lang="pt-BR"/>
           </a:p>
@@ -643,7 +645,7 @@
           <a:p>
             <a:fld id="{CCE7DC95-0A47-420E-AA60-2EBF55DD1E9C}" type="datetimeFigureOut">
               <a:rPr lang="pt-BR" smtClean="0"/>
-              <a:t>22/03/2021</a:t>
+              <a:t>26/03/2021</a:t>
             </a:fld>
             <a:endParaRPr lang="pt-BR"/>
           </a:p>
@@ -813,7 +815,7 @@
           <a:p>
             <a:fld id="{CCE7DC95-0A47-420E-AA60-2EBF55DD1E9C}" type="datetimeFigureOut">
               <a:rPr lang="pt-BR" smtClean="0"/>
-              <a:t>22/03/2021</a:t>
+              <a:t>26/03/2021</a:t>
             </a:fld>
             <a:endParaRPr lang="pt-BR"/>
           </a:p>
@@ -1059,7 +1061,7 @@
           <a:p>
             <a:fld id="{CCE7DC95-0A47-420E-AA60-2EBF55DD1E9C}" type="datetimeFigureOut">
               <a:rPr lang="pt-BR" smtClean="0"/>
-              <a:t>22/03/2021</a:t>
+              <a:t>26/03/2021</a:t>
             </a:fld>
             <a:endParaRPr lang="pt-BR"/>
           </a:p>
@@ -1347,7 +1349,7 @@
           <a:p>
             <a:fld id="{CCE7DC95-0A47-420E-AA60-2EBF55DD1E9C}" type="datetimeFigureOut">
               <a:rPr lang="pt-BR" smtClean="0"/>
-              <a:t>22/03/2021</a:t>
+              <a:t>26/03/2021</a:t>
             </a:fld>
             <a:endParaRPr lang="pt-BR"/>
           </a:p>
@@ -1769,7 +1771,7 @@
           <a:p>
             <a:fld id="{CCE7DC95-0A47-420E-AA60-2EBF55DD1E9C}" type="datetimeFigureOut">
               <a:rPr lang="pt-BR" smtClean="0"/>
-              <a:t>22/03/2021</a:t>
+              <a:t>26/03/2021</a:t>
             </a:fld>
             <a:endParaRPr lang="pt-BR"/>
           </a:p>
@@ -1887,7 +1889,7 @@
           <a:p>
             <a:fld id="{CCE7DC95-0A47-420E-AA60-2EBF55DD1E9C}" type="datetimeFigureOut">
               <a:rPr lang="pt-BR" smtClean="0"/>
-              <a:t>22/03/2021</a:t>
+              <a:t>26/03/2021</a:t>
             </a:fld>
             <a:endParaRPr lang="pt-BR"/>
           </a:p>
@@ -1982,7 +1984,7 @@
           <a:p>
             <a:fld id="{CCE7DC95-0A47-420E-AA60-2EBF55DD1E9C}" type="datetimeFigureOut">
               <a:rPr lang="pt-BR" smtClean="0"/>
-              <a:t>22/03/2021</a:t>
+              <a:t>26/03/2021</a:t>
             </a:fld>
             <a:endParaRPr lang="pt-BR"/>
           </a:p>
@@ -2259,7 +2261,7 @@
           <a:p>
             <a:fld id="{CCE7DC95-0A47-420E-AA60-2EBF55DD1E9C}" type="datetimeFigureOut">
               <a:rPr lang="pt-BR" smtClean="0"/>
-              <a:t>22/03/2021</a:t>
+              <a:t>26/03/2021</a:t>
             </a:fld>
             <a:endParaRPr lang="pt-BR"/>
           </a:p>
@@ -2512,7 +2514,7 @@
           <a:p>
             <a:fld id="{CCE7DC95-0A47-420E-AA60-2EBF55DD1E9C}" type="datetimeFigureOut">
               <a:rPr lang="pt-BR" smtClean="0"/>
-              <a:t>22/03/2021</a:t>
+              <a:t>26/03/2021</a:t>
             </a:fld>
             <a:endParaRPr lang="pt-BR"/>
           </a:p>
@@ -2725,7 +2727,7 @@
           <a:p>
             <a:fld id="{CCE7DC95-0A47-420E-AA60-2EBF55DD1E9C}" type="datetimeFigureOut">
               <a:rPr lang="pt-BR" smtClean="0"/>
-              <a:t>22/03/2021</a:t>
+              <a:t>26/03/2021</a:t>
             </a:fld>
             <a:endParaRPr lang="pt-BR"/>
           </a:p>
@@ -3124,11 +3126,7 @@
           <a:p>
             <a:r>
               <a:rPr lang="en-US" dirty="0" smtClean="0"/>
-              <a:t>Calculator </a:t>
-            </a:r>
-            <a:r>
-              <a:rPr lang="en-US" dirty="0" smtClean="0"/>
-              <a:t>Project</a:t>
+              <a:t>Calculator Project</a:t>
             </a:r>
             <a:endParaRPr lang="pt-BR" dirty="0"/>
           </a:p>
@@ -3258,6 +3256,13 @@
   <p:clrMapOvr>
     <a:masterClrMapping/>
   </p:clrMapOvr>
+  <p:timing>
+    <p:tnLst>
+      <p:par>
+        <p:cTn id="1" dur="indefinite" restart="never" nodeType="tmRoot"/>
+      </p:par>
+    </p:tnLst>
+  </p:timing>
 </p:sld>
 </file>
 
@@ -3296,61 +3301,57 @@
             <a:pPr algn="l"/>
             <a:r>
               <a:rPr lang="en-US" dirty="0" smtClean="0"/>
+              <a:t>Summary</a:t>
+            </a:r>
+            <a:endParaRPr lang="pt-BR" dirty="0"/>
+          </a:p>
+        </p:txBody>
+      </p:sp>
+      <p:sp>
+        <p:nvSpPr>
+          <p:cNvPr id="3" name="Espaço Reservado para Conteúdo 2"/>
+          <p:cNvSpPr>
+            <a:spLocks noGrp="1"/>
+          </p:cNvSpPr>
+          <p:nvPr>
+            <p:ph idx="1"/>
+          </p:nvPr>
+        </p:nvSpPr>
+        <p:spPr/>
+        <p:txBody>
+          <a:bodyPr/>
+          <a:lstStyle/>
+          <a:p>
+            <a:r>
+              <a:rPr lang="en-US" dirty="0" smtClean="0"/>
               <a:t>Pre-requirements</a:t>
             </a:r>
-            <a:endParaRPr lang="pt-BR" dirty="0"/>
-          </a:p>
-        </p:txBody>
-      </p:sp>
-      <p:sp>
-        <p:nvSpPr>
-          <p:cNvPr id="3" name="Espaço Reservado para Conteúdo 2"/>
-          <p:cNvSpPr>
-            <a:spLocks noGrp="1"/>
-          </p:cNvSpPr>
-          <p:nvPr>
-            <p:ph idx="1"/>
-          </p:nvPr>
-        </p:nvSpPr>
-        <p:spPr/>
-        <p:txBody>
-          <a:bodyPr/>
-          <a:lstStyle/>
+            <a:endParaRPr lang="en-US" dirty="0" smtClean="0"/>
+          </a:p>
           <a:p>
             <a:r>
               <a:rPr lang="en-US" dirty="0" smtClean="0"/>
-              <a:t>Java JDK 8</a:t>
-            </a:r>
+              <a:t>Project structure</a:t>
+            </a:r>
+            <a:endParaRPr lang="en-US" dirty="0" smtClean="0"/>
           </a:p>
           <a:p>
             <a:r>
               <a:rPr lang="en-US" dirty="0" smtClean="0"/>
-              <a:t>Maven </a:t>
-            </a:r>
+              <a:t>Running the project</a:t>
+            </a:r>
+            <a:endParaRPr lang="en-US" dirty="0" smtClean="0"/>
+          </a:p>
+          <a:p>
             <a:r>
               <a:rPr lang="en-US" dirty="0" smtClean="0"/>
-              <a:t>3.5</a:t>
-            </a:r>
-            <a:endParaRPr lang="en-US" dirty="0" smtClean="0"/>
+              <a:t>Front-end</a:t>
+            </a:r>
           </a:p>
           <a:p>
             <a:r>
               <a:rPr lang="en-US" dirty="0" smtClean="0"/>
-              <a:t>Eclipse (Oxygen</a:t>
-            </a:r>
-            <a:r>
-              <a:rPr lang="en-US" dirty="0" smtClean="0"/>
-              <a:t>)</a:t>
-            </a:r>
-          </a:p>
-          <a:p>
-            <a:r>
-              <a:rPr lang="en-US" dirty="0" err="1" smtClean="0"/>
-              <a:t>Git</a:t>
-            </a:r>
-            <a:r>
-              <a:rPr lang="en-US" dirty="0" smtClean="0"/>
-              <a:t> (Windows version 2.31)</a:t>
+              <a:t>Going deeper</a:t>
             </a:r>
             <a:endParaRPr lang="pt-BR" dirty="0"/>
           </a:p>
@@ -3420,6 +3421,13 @@
   <p:clrMapOvr>
     <a:masterClrMapping/>
   </p:clrMapOvr>
+  <p:timing>
+    <p:tnLst>
+      <p:par>
+        <p:cTn id="1" dur="indefinite" restart="never" nodeType="tmRoot"/>
+      </p:par>
+    </p:tnLst>
+  </p:timing>
 </p:sld>
 </file>
 
@@ -3458,6 +3466,166 @@
             <a:pPr algn="l"/>
             <a:r>
               <a:rPr lang="en-US" dirty="0" smtClean="0"/>
+              <a:t>Pre-requirements</a:t>
+            </a:r>
+            <a:endParaRPr lang="pt-BR" dirty="0"/>
+          </a:p>
+        </p:txBody>
+      </p:sp>
+      <p:sp>
+        <p:nvSpPr>
+          <p:cNvPr id="3" name="Espaço Reservado para Conteúdo 2"/>
+          <p:cNvSpPr>
+            <a:spLocks noGrp="1"/>
+          </p:cNvSpPr>
+          <p:nvPr>
+            <p:ph idx="1"/>
+          </p:nvPr>
+        </p:nvSpPr>
+        <p:spPr/>
+        <p:txBody>
+          <a:bodyPr/>
+          <a:lstStyle/>
+          <a:p>
+            <a:r>
+              <a:rPr lang="en-US" dirty="0" smtClean="0"/>
+              <a:t>Java JDK 8</a:t>
+            </a:r>
+          </a:p>
+          <a:p>
+            <a:r>
+              <a:rPr lang="en-US" dirty="0" smtClean="0"/>
+              <a:t>Maven 3.5</a:t>
+            </a:r>
+          </a:p>
+          <a:p>
+            <a:r>
+              <a:rPr lang="en-US" dirty="0" smtClean="0"/>
+              <a:t>Eclipse (Oxygen)</a:t>
+            </a:r>
+          </a:p>
+          <a:p>
+            <a:r>
+              <a:rPr lang="en-US" dirty="0" err="1" smtClean="0"/>
+              <a:t>Git</a:t>
+            </a:r>
+            <a:r>
+              <a:rPr lang="en-US" dirty="0" smtClean="0"/>
+              <a:t> (Windows version 2.31)</a:t>
+            </a:r>
+            <a:endParaRPr lang="pt-BR" dirty="0"/>
+          </a:p>
+        </p:txBody>
+      </p:sp>
+      <p:pic>
+        <p:nvPicPr>
+          <p:cNvPr id="4098" name="Picture 2"/>
+          <p:cNvPicPr>
+            <a:picLocks noChangeAspect="1" noChangeArrowheads="1"/>
+          </p:cNvPicPr>
+          <p:nvPr/>
+        </p:nvPicPr>
+        <p:blipFill>
+          <a:blip r:embed="rId2">
+            <a:extLst>
+              <a:ext uri="{28A0092B-C50C-407E-A947-70E740481C1C}">
+                <a14:useLocalDpi xmlns:a14="http://schemas.microsoft.com/office/drawing/2010/main" val="0"/>
+              </a:ext>
+            </a:extLst>
+          </a:blip>
+          <a:srcRect/>
+          <a:stretch>
+            <a:fillRect/>
+          </a:stretch>
+        </p:blipFill>
+        <p:spPr bwMode="auto">
+          <a:xfrm>
+            <a:off x="7596336" y="188640"/>
+            <a:ext cx="1200150" cy="857250"/>
+          </a:xfrm>
+          <a:prstGeom prst="rect">
+            <a:avLst/>
+          </a:prstGeom>
+          <a:noFill/>
+          <a:ln>
+            <a:noFill/>
+          </a:ln>
+          <a:extLst>
+            <a:ext uri="{909E8E84-426E-40DD-AFC4-6F175D3DCCD1}">
+              <a14:hiddenFill xmlns:a14="http://schemas.microsoft.com/office/drawing/2010/main">
+                <a:solidFill>
+                  <a:schemeClr val="accent1"/>
+                </a:solidFill>
+              </a14:hiddenFill>
+            </a:ext>
+            <a:ext uri="{91240B29-F687-4F45-9708-019B960494DF}">
+              <a14:hiddenLine xmlns:a14="http://schemas.microsoft.com/office/drawing/2010/main" w="9525">
+                <a:solidFill>
+                  <a:schemeClr val="tx1"/>
+                </a:solidFill>
+                <a:miter lim="800000"/>
+                <a:headEnd/>
+                <a:tailEnd/>
+              </a14:hiddenLine>
+            </a:ext>
+          </a:extLst>
+        </p:spPr>
+      </p:pic>
+    </p:spTree>
+    <p:extLst>
+      <p:ext uri="{BB962C8B-B14F-4D97-AF65-F5344CB8AC3E}">
+        <p14:creationId xmlns:p14="http://schemas.microsoft.com/office/powerpoint/2010/main" val="1956349155"/>
+      </p:ext>
+    </p:extLst>
+  </p:cSld>
+  <p:clrMapOvr>
+    <a:masterClrMapping/>
+  </p:clrMapOvr>
+  <p:timing>
+    <p:tnLst>
+      <p:par>
+        <p:cTn id="1" dur="indefinite" restart="never" nodeType="tmRoot"/>
+      </p:par>
+    </p:tnLst>
+  </p:timing>
+</p:sld>
+</file>
+
+<file path=ppt/slides/slide4.xml><?xml version="1.0" encoding="utf-8"?>
+<p:sld xmlns:a="http://schemas.openxmlformats.org/drawingml/2006/main" xmlns:r="http://schemas.openxmlformats.org/officeDocument/2006/relationships" xmlns:p="http://schemas.openxmlformats.org/presentationml/2006/main">
+  <p:cSld>
+    <p:spTree>
+      <p:nvGrpSpPr>
+        <p:cNvPr id="1" name=""/>
+        <p:cNvGrpSpPr/>
+        <p:nvPr/>
+      </p:nvGrpSpPr>
+      <p:grpSpPr>
+        <a:xfrm>
+          <a:off x="0" y="0"/>
+          <a:ext cx="0" cy="0"/>
+          <a:chOff x="0" y="0"/>
+          <a:chExt cx="0" cy="0"/>
+        </a:xfrm>
+      </p:grpSpPr>
+      <p:sp>
+        <p:nvSpPr>
+          <p:cNvPr id="2" name="Título 1"/>
+          <p:cNvSpPr>
+            <a:spLocks noGrp="1"/>
+          </p:cNvSpPr>
+          <p:nvPr>
+            <p:ph type="title"/>
+          </p:nvPr>
+        </p:nvSpPr>
+        <p:spPr/>
+        <p:txBody>
+          <a:bodyPr/>
+          <a:lstStyle/>
+          <a:p>
+            <a:pPr algn="l"/>
+            <a:r>
+              <a:rPr lang="en-US" dirty="0" smtClean="0"/>
               <a:t>Project structure</a:t>
             </a:r>
             <a:endParaRPr lang="pt-BR" dirty="0"/>
@@ -3548,7 +3716,6 @@
               <a:rPr lang="en-US" sz="2000" dirty="0" smtClean="0"/>
               <a:t>: class bean which controls Calc.html </a:t>
             </a:r>
-            <a:endParaRPr lang="en-US" sz="2000" dirty="0" smtClean="0"/>
           </a:p>
           <a:p>
             <a:pPr marL="457200" indent="-457200">
@@ -3563,7 +3730,6 @@
               <a:rPr lang="en-US" sz="2000" dirty="0" smtClean="0"/>
               <a:t>: class contains some basic Junit tests</a:t>
             </a:r>
-            <a:endParaRPr lang="en-US" sz="2000" dirty="0" smtClean="0"/>
           </a:p>
           <a:p>
             <a:pPr marL="457200" indent="-457200">
@@ -3719,7 +3885,7 @@
 </p:sld>
 </file>
 
-<file path=ppt/slides/slide4.xml><?xml version="1.0" encoding="utf-8"?>
+<file path=ppt/slides/slide5.xml><?xml version="1.0" encoding="utf-8"?>
 <p:sld xmlns:a="http://schemas.openxmlformats.org/drawingml/2006/main" xmlns:r="http://schemas.openxmlformats.org/officeDocument/2006/relationships" xmlns:p="http://schemas.openxmlformats.org/presentationml/2006/main">
   <p:cSld>
     <p:spTree>
@@ -3754,11 +3920,7 @@
             <a:pPr algn="l"/>
             <a:r>
               <a:rPr lang="en-US" dirty="0" smtClean="0"/>
-              <a:t>Running the </a:t>
-            </a:r>
-            <a:r>
-              <a:rPr lang="en-US" dirty="0" smtClean="0"/>
-              <a:t>project</a:t>
+              <a:t>Running the project</a:t>
             </a:r>
             <a:endParaRPr lang="pt-BR" dirty="0"/>
           </a:p>
@@ -3788,11 +3950,7 @@
           <a:p>
             <a:r>
               <a:rPr lang="en-US" sz="2000" dirty="0" smtClean="0"/>
-              <a:t>Using the </a:t>
-            </a:r>
-            <a:r>
-              <a:rPr lang="en-US" sz="2000" dirty="0" smtClean="0"/>
-              <a:t>eclipse:</a:t>
+              <a:t>Using the eclipse:</a:t>
             </a:r>
           </a:p>
           <a:p>
@@ -4072,7 +4230,7 @@
 </p:sld>
 </file>
 
-<file path=ppt/slides/slide5.xml><?xml version="1.0" encoding="utf-8"?>
+<file path=ppt/slides/slide6.xml><?xml version="1.0" encoding="utf-8"?>
 <p:sld xmlns:a="http://schemas.openxmlformats.org/drawingml/2006/main" xmlns:r="http://schemas.openxmlformats.org/officeDocument/2006/relationships" xmlns:p="http://schemas.openxmlformats.org/presentationml/2006/main">
   <p:cSld>
     <p:spTree>
@@ -4400,10 +4558,17 @@
   <p:clrMapOvr>
     <a:masterClrMapping/>
   </p:clrMapOvr>
+  <p:timing>
+    <p:tnLst>
+      <p:par>
+        <p:cTn id="1" dur="indefinite" restart="never" nodeType="tmRoot"/>
+      </p:par>
+    </p:tnLst>
+  </p:timing>
 </p:sld>
 </file>
 
-<file path=ppt/slides/slide6.xml><?xml version="1.0" encoding="utf-8"?>
+<file path=ppt/slides/slide7.xml><?xml version="1.0" encoding="utf-8"?>
 <p:sld xmlns:a="http://schemas.openxmlformats.org/drawingml/2006/main" xmlns:r="http://schemas.openxmlformats.org/officeDocument/2006/relationships" xmlns:p="http://schemas.openxmlformats.org/presentationml/2006/main">
   <p:cSld>
     <p:spTree>
@@ -4430,19 +4595,15 @@
             <p:ph type="title"/>
           </p:nvPr>
         </p:nvSpPr>
-        <p:spPr>
-          <a:xfrm>
-            <a:off x="562302" y="3068960"/>
-            <a:ext cx="8229600" cy="1143000"/>
-          </a:xfrm>
-        </p:spPr>
-        <p:txBody>
-          <a:bodyPr/>
-          <a:lstStyle/>
-          <a:p>
+        <p:spPr/>
+        <p:txBody>
+          <a:bodyPr/>
+          <a:lstStyle/>
+          <a:p>
+            <a:pPr algn="l"/>
             <a:r>
               <a:rPr lang="en-US" dirty="0" smtClean="0"/>
-              <a:t>Doubts?</a:t>
+              <a:t>Going deeper</a:t>
             </a:r>
             <a:endParaRPr lang="pt-BR" dirty="0"/>
           </a:p>
@@ -4504,6 +4665,401 @@
       </p:pic>
       <p:sp>
         <p:nvSpPr>
+          <p:cNvPr id="5" name="Espaço Reservado para Conteúdo 4"/>
+          <p:cNvSpPr>
+            <a:spLocks noGrp="1"/>
+          </p:cNvSpPr>
+          <p:nvPr>
+            <p:ph idx="1"/>
+          </p:nvPr>
+        </p:nvSpPr>
+        <p:spPr/>
+        <p:txBody>
+          <a:bodyPr/>
+          <a:lstStyle/>
+          <a:p>
+            <a:r>
+              <a:rPr lang="pt-BR" dirty="0" smtClean="0">
+                <a:hlinkClick r:id="rId3" action="ppaction://hlinkfile"/>
+              </a:rPr>
+              <a:t>Eclipse</a:t>
+            </a:r>
+            <a:endParaRPr lang="pt-BR" dirty="0" smtClean="0"/>
+          </a:p>
+          <a:p>
+            <a:endParaRPr lang="en-US" dirty="0"/>
+          </a:p>
+          <a:p>
+            <a:r>
+              <a:rPr lang="pt-BR" dirty="0" err="1" smtClean="0"/>
+              <a:t>calculationEngine</a:t>
+            </a:r>
+            <a:r>
+              <a:rPr lang="pt-BR" dirty="0" smtClean="0"/>
+              <a:t>:</a:t>
+            </a:r>
+          </a:p>
+        </p:txBody>
+      </p:sp>
+      <p:sp>
+        <p:nvSpPr>
+          <p:cNvPr id="10" name="Seta para baixo 9"/>
+          <p:cNvSpPr/>
+          <p:nvPr/>
+        </p:nvSpPr>
+        <p:spPr>
+          <a:xfrm>
+            <a:off x="611560" y="3501008"/>
+            <a:ext cx="288032" cy="2520280"/>
+          </a:xfrm>
+          <a:prstGeom prst="downArrow">
+            <a:avLst/>
+          </a:prstGeom>
+        </p:spPr>
+        <p:style>
+          <a:lnRef idx="2">
+            <a:schemeClr val="accent1">
+              <a:shade val="50000"/>
+            </a:schemeClr>
+          </a:lnRef>
+          <a:fillRef idx="1">
+            <a:schemeClr val="accent1"/>
+          </a:fillRef>
+          <a:effectRef idx="0">
+            <a:schemeClr val="accent1"/>
+          </a:effectRef>
+          <a:fontRef idx="minor">
+            <a:schemeClr val="lt1"/>
+          </a:fontRef>
+        </p:style>
+        <p:txBody>
+          <a:bodyPr rtlCol="0" anchor="ctr"/>
+          <a:lstStyle/>
+          <a:p>
+            <a:pPr algn="ctr"/>
+            <a:endParaRPr lang="pt-BR"/>
+          </a:p>
+        </p:txBody>
+      </p:sp>
+      <p:sp>
+        <p:nvSpPr>
+          <p:cNvPr id="11" name="Seta para cima 10"/>
+          <p:cNvSpPr/>
+          <p:nvPr/>
+        </p:nvSpPr>
+        <p:spPr>
+          <a:xfrm>
+            <a:off x="4932040" y="3465004"/>
+            <a:ext cx="216024" cy="2592288"/>
+          </a:xfrm>
+          <a:prstGeom prst="upArrow">
+            <a:avLst/>
+          </a:prstGeom>
+        </p:spPr>
+        <p:style>
+          <a:lnRef idx="2">
+            <a:schemeClr val="accent1">
+              <a:shade val="50000"/>
+            </a:schemeClr>
+          </a:lnRef>
+          <a:fillRef idx="1">
+            <a:schemeClr val="accent1"/>
+          </a:fillRef>
+          <a:effectRef idx="0">
+            <a:schemeClr val="accent1"/>
+          </a:effectRef>
+          <a:fontRef idx="minor">
+            <a:schemeClr val="lt1"/>
+          </a:fontRef>
+        </p:style>
+        <p:txBody>
+          <a:bodyPr rtlCol="0" anchor="ctr"/>
+          <a:lstStyle/>
+          <a:p>
+            <a:pPr algn="ctr"/>
+            <a:endParaRPr lang="pt-BR"/>
+          </a:p>
+        </p:txBody>
+      </p:sp>
+      <p:sp>
+        <p:nvSpPr>
+          <p:cNvPr id="12" name="Retângulo 11"/>
+          <p:cNvSpPr/>
+          <p:nvPr/>
+        </p:nvSpPr>
+        <p:spPr>
+          <a:xfrm>
+            <a:off x="395536" y="3506232"/>
+            <a:ext cx="4752528" cy="1938992"/>
+          </a:xfrm>
+          <a:prstGeom prst="rect">
+            <a:avLst/>
+          </a:prstGeom>
+        </p:spPr>
+        <p:txBody>
+          <a:bodyPr wrap="square">
+            <a:spAutoFit/>
+          </a:bodyPr>
+          <a:lstStyle/>
+          <a:p>
+            <a:pPr lvl="1"/>
+            <a:r>
+              <a:rPr lang="en-US" sz="2400" dirty="0"/>
+              <a:t>100 + 6/(</a:t>
+            </a:r>
+            <a:r>
+              <a:rPr lang="en-US" sz="2400" dirty="0" err="1"/>
+              <a:t>sqrt</a:t>
+            </a:r>
+            <a:r>
+              <a:rPr lang="en-US" sz="2400" dirty="0"/>
+              <a:t>(121)*2 - 20) </a:t>
+            </a:r>
+            <a:r>
+              <a:rPr lang="en-US" sz="2400" dirty="0" smtClean="0"/>
+              <a:t>- </a:t>
+            </a:r>
+            <a:r>
+              <a:rPr lang="en-US" sz="2400" dirty="0"/>
+              <a:t>2</a:t>
+            </a:r>
+          </a:p>
+          <a:p>
+            <a:pPr lvl="1"/>
+            <a:r>
+              <a:rPr lang="en-US" sz="2400" dirty="0"/>
+              <a:t>           6/(</a:t>
+            </a:r>
+            <a:r>
+              <a:rPr lang="en-US" sz="2400" dirty="0" err="1"/>
+              <a:t>sqrt</a:t>
+            </a:r>
+            <a:r>
+              <a:rPr lang="en-US" sz="2400" dirty="0"/>
+              <a:t>(121)*2 - 20) </a:t>
+            </a:r>
+          </a:p>
+          <a:p>
+            <a:pPr lvl="1"/>
+            <a:r>
+              <a:rPr lang="en-US" sz="2400" dirty="0"/>
+              <a:t>               (</a:t>
+            </a:r>
+            <a:r>
+              <a:rPr lang="en-US" sz="2400" dirty="0" err="1"/>
+              <a:t>sqrt</a:t>
+            </a:r>
+            <a:r>
+              <a:rPr lang="en-US" sz="2400" dirty="0"/>
+              <a:t>(121)*2 - 20)</a:t>
+            </a:r>
+          </a:p>
+          <a:p>
+            <a:pPr lvl="1"/>
+            <a:r>
+              <a:rPr lang="en-US" sz="2400" dirty="0"/>
+              <a:t>	          </a:t>
+            </a:r>
+            <a:r>
+              <a:rPr lang="en-US" sz="2400" dirty="0" err="1"/>
+              <a:t>sqrt</a:t>
+            </a:r>
+            <a:r>
+              <a:rPr lang="en-US" sz="2400" dirty="0"/>
+              <a:t>(121)*2</a:t>
+            </a:r>
+          </a:p>
+          <a:p>
+            <a:pPr lvl="1"/>
+            <a:r>
+              <a:rPr lang="en-US" sz="2400" dirty="0"/>
+              <a:t>		11	</a:t>
+            </a:r>
+          </a:p>
+        </p:txBody>
+      </p:sp>
+      <p:sp>
+        <p:nvSpPr>
+          <p:cNvPr id="16" name="Retângulo 15"/>
+          <p:cNvSpPr/>
+          <p:nvPr/>
+        </p:nvSpPr>
+        <p:spPr>
+          <a:xfrm>
+            <a:off x="4716016" y="3434224"/>
+            <a:ext cx="4752528" cy="1938992"/>
+          </a:xfrm>
+          <a:prstGeom prst="rect">
+            <a:avLst/>
+          </a:prstGeom>
+        </p:spPr>
+        <p:txBody>
+          <a:bodyPr wrap="square">
+            <a:spAutoFit/>
+          </a:bodyPr>
+          <a:lstStyle/>
+          <a:p>
+            <a:pPr lvl="1"/>
+            <a:r>
+              <a:rPr lang="en-US" sz="2400" dirty="0" smtClean="0"/>
+              <a:t>11</a:t>
+            </a:r>
+          </a:p>
+          <a:p>
+            <a:pPr lvl="1"/>
+            <a:r>
+              <a:rPr lang="en-US" sz="2400" dirty="0" smtClean="0"/>
+              <a:t>11*2 = 22</a:t>
+            </a:r>
+          </a:p>
+          <a:p>
+            <a:pPr lvl="1"/>
+            <a:r>
+              <a:rPr lang="en-US" sz="2400" dirty="0" smtClean="0"/>
+              <a:t>22 - 20 = 2</a:t>
+            </a:r>
+          </a:p>
+          <a:p>
+            <a:pPr lvl="1"/>
+            <a:r>
+              <a:rPr lang="en-US" sz="2400" dirty="0" smtClean="0"/>
+              <a:t>6/2 = 3</a:t>
+            </a:r>
+          </a:p>
+          <a:p>
+            <a:pPr lvl="1"/>
+            <a:r>
+              <a:rPr lang="en-US" sz="2400" dirty="0" smtClean="0"/>
+              <a:t>100 + 3 - 2 = 1</a:t>
+            </a:r>
+            <a:r>
+              <a:rPr lang="en-US" sz="2400" dirty="0"/>
+              <a:t>	</a:t>
+            </a:r>
+          </a:p>
+        </p:txBody>
+      </p:sp>
+    </p:spTree>
+    <p:extLst>
+      <p:ext uri="{BB962C8B-B14F-4D97-AF65-F5344CB8AC3E}">
+        <p14:creationId xmlns:p14="http://schemas.microsoft.com/office/powerpoint/2010/main" val="3247062367"/>
+      </p:ext>
+    </p:extLst>
+  </p:cSld>
+  <p:clrMapOvr>
+    <a:masterClrMapping/>
+  </p:clrMapOvr>
+  <p:timing>
+    <p:tnLst>
+      <p:par>
+        <p:cTn id="1" dur="indefinite" restart="never" nodeType="tmRoot"/>
+      </p:par>
+    </p:tnLst>
+  </p:timing>
+</p:sld>
+</file>
+
+<file path=ppt/slides/slide8.xml><?xml version="1.0" encoding="utf-8"?>
+<p:sld xmlns:a="http://schemas.openxmlformats.org/drawingml/2006/main" xmlns:r="http://schemas.openxmlformats.org/officeDocument/2006/relationships" xmlns:p="http://schemas.openxmlformats.org/presentationml/2006/main">
+  <p:cSld>
+    <p:spTree>
+      <p:nvGrpSpPr>
+        <p:cNvPr id="1" name=""/>
+        <p:cNvGrpSpPr/>
+        <p:nvPr/>
+      </p:nvGrpSpPr>
+      <p:grpSpPr>
+        <a:xfrm>
+          <a:off x="0" y="0"/>
+          <a:ext cx="0" cy="0"/>
+          <a:chOff x="0" y="0"/>
+          <a:chExt cx="0" cy="0"/>
+        </a:xfrm>
+      </p:grpSpPr>
+      <p:sp>
+        <p:nvSpPr>
+          <p:cNvPr id="2" name="Título 1"/>
+          <p:cNvSpPr>
+            <a:spLocks noGrp="1"/>
+          </p:cNvSpPr>
+          <p:nvPr>
+            <p:ph type="title"/>
+          </p:nvPr>
+        </p:nvSpPr>
+        <p:spPr>
+          <a:xfrm>
+            <a:off x="562302" y="3068960"/>
+            <a:ext cx="8229600" cy="1143000"/>
+          </a:xfrm>
+        </p:spPr>
+        <p:txBody>
+          <a:bodyPr/>
+          <a:lstStyle/>
+          <a:p>
+            <a:r>
+              <a:rPr lang="en-US" dirty="0" smtClean="0"/>
+              <a:t>Questions?</a:t>
+            </a:r>
+            <a:endParaRPr lang="pt-BR" dirty="0"/>
+          </a:p>
+        </p:txBody>
+      </p:sp>
+      <p:pic>
+        <p:nvPicPr>
+          <p:cNvPr id="2053" name="Picture 5"/>
+          <p:cNvPicPr>
+            <a:picLocks noChangeAspect="1" noChangeArrowheads="1"/>
+          </p:cNvPicPr>
+          <p:nvPr/>
+        </p:nvPicPr>
+        <p:blipFill>
+          <a:blip r:embed="rId2">
+            <a:extLst>
+              <a:ext uri="{28A0092B-C50C-407E-A947-70E740481C1C}">
+                <a14:useLocalDpi xmlns:a14="http://schemas.microsoft.com/office/drawing/2010/main" val="0"/>
+              </a:ext>
+            </a:extLst>
+          </a:blip>
+          <a:srcRect/>
+          <a:stretch>
+            <a:fillRect/>
+          </a:stretch>
+        </p:blipFill>
+        <p:spPr bwMode="auto">
+          <a:xfrm>
+            <a:off x="7596336" y="188640"/>
+            <a:ext cx="1200150" cy="857250"/>
+          </a:xfrm>
+          <a:prstGeom prst="rect">
+            <a:avLst/>
+          </a:prstGeom>
+          <a:noFill/>
+          <a:ln>
+            <a:noFill/>
+          </a:ln>
+          <a:extLst>
+            <a:ext uri="{909E8E84-426E-40DD-AFC4-6F175D3DCCD1}">
+              <a14:hiddenFill xmlns:a14="http://schemas.microsoft.com/office/drawing/2010/main">
+                <a:solidFill>
+                  <a:schemeClr val="accent1"/>
+                </a:solidFill>
+              </a14:hiddenFill>
+            </a:ext>
+            <a:ext uri="{91240B29-F687-4F45-9708-019B960494DF}">
+              <a14:hiddenLine xmlns:a14="http://schemas.microsoft.com/office/drawing/2010/main" w="9525">
+                <a:solidFill>
+                  <a:schemeClr val="tx1"/>
+                </a:solidFill>
+                <a:miter lim="800000"/>
+                <a:headEnd/>
+                <a:tailEnd/>
+              </a14:hiddenLine>
+            </a:ext>
+          </a:extLst>
+        </p:spPr>
+      </p:pic>
+      <p:sp>
+        <p:nvSpPr>
           <p:cNvPr id="10" name="Título 1"/>
           <p:cNvSpPr txBox="1">
             <a:spLocks/>
@@ -4562,6 +5118,13 @@
   <p:clrMapOvr>
     <a:masterClrMapping/>
   </p:clrMapOvr>
+  <p:timing>
+    <p:tnLst>
+      <p:par>
+        <p:cTn id="1" dur="indefinite" restart="never" nodeType="tmRoot"/>
+      </p:par>
+    </p:tnLst>
+  </p:timing>
 </p:sld>
 </file>
 

</xml_diff>